<commit_message>
Fix day 3 typos and demo script
Fix day 3 worksheet typos and add uoffset hint
Add day 3 demo matlab script
</commit_message>
<xml_diff>
--- a/presentations/edatc21_slides_03_horace1.pptx
+++ b/presentations/edatc21_slides_03_horace1.pptx
@@ -6,10 +6,10 @@
     <p:sldMasterId id="2147483696" r:id="rId2"/>
   </p:sldMasterIdLst>
   <p:notesMasterIdLst>
-    <p:notesMasterId r:id="rId31"/>
+    <p:notesMasterId r:id="rId32"/>
   </p:notesMasterIdLst>
   <p:handoutMasterIdLst>
-    <p:handoutMasterId r:id="rId32"/>
+    <p:handoutMasterId r:id="rId33"/>
   </p:handoutMasterIdLst>
   <p:sldIdLst>
     <p:sldId id="256" r:id="rId3"/>
@@ -40,6 +40,7 @@
     <p:sldId id="350" r:id="rId28"/>
     <p:sldId id="351" r:id="rId29"/>
     <p:sldId id="352" r:id="rId30"/>
+    <p:sldId id="358" r:id="rId31"/>
   </p:sldIdLst>
   <p:sldSz cx="9144000" cy="6858000" type="screen4x3"/>
   <p:notesSz cx="6858000" cy="9144000"/>
@@ -22265,6 +22266,663 @@
 </p:sld>
 </file>
 
+<file path=ppt/slides/slide29.xml><?xml version="1.0" encoding="utf-8"?>
+<p:sld xmlns:a="http://schemas.openxmlformats.org/drawingml/2006/main" xmlns:r="http://schemas.openxmlformats.org/officeDocument/2006/relationships" xmlns:p="http://schemas.openxmlformats.org/presentationml/2006/main">
+  <p:cSld>
+    <p:spTree>
+      <p:nvGrpSpPr>
+        <p:cNvPr id="1" name=""/>
+        <p:cNvGrpSpPr/>
+        <p:nvPr/>
+      </p:nvGrpSpPr>
+      <p:grpSpPr>
+        <a:xfrm>
+          <a:off x="0" y="0"/>
+          <a:ext cx="0" cy="0"/>
+          <a:chOff x="0" y="0"/>
+          <a:chExt cx="0" cy="0"/>
+        </a:xfrm>
+      </p:grpSpPr>
+      <p:sp>
+        <p:nvSpPr>
+          <p:cNvPr id="4" name="Rectangle 1"/>
+          <p:cNvSpPr/>
+          <p:nvPr/>
+        </p:nvSpPr>
+        <p:spPr>
+          <a:xfrm>
+            <a:off x="2700360" y="0"/>
+            <a:ext cx="6335639" cy="557281"/>
+          </a:xfrm>
+          <a:custGeom>
+            <a:avLst/>
+            <a:gdLst>
+              <a:gd name="f0" fmla="val w"/>
+              <a:gd name="f1" fmla="val h"/>
+              <a:gd name="f2" fmla="val 0"/>
+              <a:gd name="f3" fmla="val 21600"/>
+              <a:gd name="f4" fmla="*/ f0 1 21600"/>
+              <a:gd name="f5" fmla="*/ f1 1 21600"/>
+              <a:gd name="f6" fmla="val f2"/>
+              <a:gd name="f7" fmla="val f3"/>
+              <a:gd name="f8" fmla="+- f7 0 f6"/>
+              <a:gd name="f9" fmla="*/ f8 1 21600"/>
+              <a:gd name="f10" fmla="*/ f6 1 f9"/>
+              <a:gd name="f11" fmla="*/ f7 1 f9"/>
+              <a:gd name="f12" fmla="*/ f10 f4 1"/>
+              <a:gd name="f13" fmla="*/ f11 f4 1"/>
+              <a:gd name="f14" fmla="*/ f11 f5 1"/>
+              <a:gd name="f15" fmla="*/ f10 f5 1"/>
+            </a:gdLst>
+            <a:ahLst/>
+            <a:cxnLst>
+              <a:cxn ang="3cd4">
+                <a:pos x="hc" y="t"/>
+              </a:cxn>
+              <a:cxn ang="0">
+                <a:pos x="r" y="vc"/>
+              </a:cxn>
+              <a:cxn ang="cd4">
+                <a:pos x="hc" y="b"/>
+              </a:cxn>
+              <a:cxn ang="cd2">
+                <a:pos x="l" y="vc"/>
+              </a:cxn>
+            </a:cxnLst>
+            <a:rect l="f12" t="f15" r="f13" b="f14"/>
+            <a:pathLst>
+              <a:path w="21600" h="21600">
+                <a:moveTo>
+                  <a:pt x="f2" y="f2"/>
+                </a:moveTo>
+                <a:lnTo>
+                  <a:pt x="f3" y="f2"/>
+                </a:lnTo>
+                <a:lnTo>
+                  <a:pt x="f3" y="f3"/>
+                </a:lnTo>
+                <a:lnTo>
+                  <a:pt x="f2" y="f3"/>
+                </a:lnTo>
+                <a:lnTo>
+                  <a:pt x="f2" y="f2"/>
+                </a:lnTo>
+                <a:close/>
+              </a:path>
+            </a:pathLst>
+          </a:custGeom>
+          <a:noFill/>
+          <a:ln cap="flat">
+            <a:noFill/>
+            <a:prstDash val="solid"/>
+          </a:ln>
+        </p:spPr>
+        <p:txBody>
+          <a:bodyPr vert="horz" wrap="square" lIns="90004" tIns="46798" rIns="90004" bIns="46798" anchor="ctr" anchorCtr="0" compatLnSpc="1">
+            <a:normAutofit/>
+          </a:bodyPr>
+          <a:lstStyle/>
+          <a:p>
+            <a:pPr marL="0" marR="0" lvl="0" indent="0" algn="r" defTabSz="914400" rtl="0" fontAlgn="auto" hangingPunct="0">
+              <a:lnSpc>
+                <a:spcPct val="100000"/>
+              </a:lnSpc>
+              <a:spcBef>
+                <a:spcPts val="0"/>
+              </a:spcBef>
+              <a:spcAft>
+                <a:spcPts val="0"/>
+              </a:spcAft>
+              <a:buNone/>
+              <a:tabLst>
+                <a:tab pos="0" algn="l"/>
+                <a:tab pos="914400" algn="l"/>
+                <a:tab pos="1828800" algn="l"/>
+                <a:tab pos="2743200" algn="l"/>
+                <a:tab pos="3657600" algn="l"/>
+                <a:tab pos="4572000" algn="l"/>
+                <a:tab pos="5486400" algn="l"/>
+                <a:tab pos="6400800" algn="l"/>
+                <a:tab pos="7315200" algn="l"/>
+                <a:tab pos="8229600" algn="l"/>
+                <a:tab pos="9144000" algn="l"/>
+                <a:tab pos="10058400" algn="l"/>
+              </a:tabLst>
+              <a:defRPr sz="1800" b="0" i="0" u="none" strike="noStrike" kern="0" cap="none" spc="0" baseline="0">
+                <a:solidFill>
+                  <a:srgbClr val="000000"/>
+                </a:solidFill>
+                <a:uFillTx/>
+              </a:defRPr>
+            </a:pPr>
+            <a:r>
+              <a:rPr lang="en-US" sz="3000" i="0" u="none" strike="noStrike" kern="1200" cap="none" spc="0" baseline="0" dirty="0" smtClean="0">
+                <a:solidFill>
+                  <a:srgbClr val="FFFFFF"/>
+                </a:solidFill>
+                <a:uFillTx/>
+                <a:latin typeface="Lucida Sans" pitchFamily="34"/>
+                <a:ea typeface="Arial" pitchFamily="34"/>
+                <a:cs typeface="Arial" pitchFamily="34"/>
+              </a:rPr>
+              <a:t>Next</a:t>
+            </a:r>
+            <a:endParaRPr lang="en-US" sz="3000" b="0" i="0" u="none" strike="noStrike" kern="1200" cap="none" spc="0" baseline="0" dirty="0">
+              <a:solidFill>
+                <a:srgbClr val="FFFFFF"/>
+              </a:solidFill>
+              <a:uFillTx/>
+              <a:latin typeface="Lucida Sans" pitchFamily="34"/>
+              <a:ea typeface="Arial" pitchFamily="34"/>
+              <a:cs typeface="Arial" pitchFamily="34"/>
+            </a:endParaRPr>
+          </a:p>
+        </p:txBody>
+      </p:sp>
+      <p:sp>
+        <p:nvSpPr>
+          <p:cNvPr id="5" name="Text Placeholder 2"/>
+          <p:cNvSpPr>
+            <a:spLocks noGrp="1"/>
+          </p:cNvSpPr>
+          <p:nvPr>
+            <p:ph type="body" idx="1"/>
+          </p:nvPr>
+        </p:nvSpPr>
+        <p:spPr>
+          <a:xfrm>
+            <a:off x="457200" y="1371600"/>
+            <a:ext cx="8229600" cy="5210355"/>
+          </a:xfrm>
+        </p:spPr>
+        <p:txBody>
+          <a:bodyPr>
+            <a:normAutofit/>
+          </a:bodyPr>
+          <a:lstStyle/>
+          <a:p>
+            <a:pPr marL="457200" indent="-457200">
+              <a:buFont typeface="Arial" panose="020B0604020202020204" pitchFamily="34" charset="0"/>
+              <a:buChar char="•"/>
+            </a:pPr>
+            <a:r>
+              <a:rPr lang="en-GB" sz="2400" dirty="0" smtClean="0">
+                <a:latin typeface="+mn-lt"/>
+              </a:rPr>
+              <a:t>Thursday</a:t>
+            </a:r>
+          </a:p>
+          <a:p>
+            <a:pPr marL="1143000" lvl="1" indent="-457200">
+              <a:buFont typeface="Arial" panose="020B0604020202020204" pitchFamily="34" charset="0"/>
+              <a:buChar char="•"/>
+            </a:pPr>
+            <a:r>
+              <a:rPr lang="en-GB" sz="1600" dirty="0" smtClean="0">
+                <a:latin typeface="+mn-lt"/>
+              </a:rPr>
+              <a:t>Background subtraction</a:t>
+            </a:r>
+          </a:p>
+          <a:p>
+            <a:pPr marL="1143000" lvl="1" indent="-457200">
+              <a:buFont typeface="Arial" panose="020B0604020202020204" pitchFamily="34" charset="0"/>
+              <a:buChar char="•"/>
+            </a:pPr>
+            <a:r>
+              <a:rPr lang="en-GB" sz="1600" dirty="0" smtClean="0">
+                <a:latin typeface="+mn-lt"/>
+              </a:rPr>
+              <a:t>Symmetrisation</a:t>
+            </a:r>
+          </a:p>
+          <a:p>
+            <a:pPr marL="1143000" lvl="1" indent="-457200">
+              <a:buFont typeface="Arial" panose="020B0604020202020204" pitchFamily="34" charset="0"/>
+              <a:buChar char="•"/>
+            </a:pPr>
+            <a:r>
+              <a:rPr lang="en-GB" sz="1600" dirty="0" err="1" smtClean="0">
+                <a:latin typeface="+mn-lt"/>
+              </a:rPr>
+              <a:t>Spurions</a:t>
+            </a:r>
+            <a:endParaRPr lang="en-GB" sz="1600" dirty="0" smtClean="0">
+              <a:latin typeface="+mn-lt"/>
+            </a:endParaRPr>
+          </a:p>
+          <a:p>
+            <a:pPr marL="1143000" lvl="1" indent="-457200">
+              <a:buFont typeface="Arial" panose="020B0604020202020204" pitchFamily="34" charset="0"/>
+              <a:buChar char="•"/>
+            </a:pPr>
+            <a:r>
+              <a:rPr lang="en-GB" sz="1600" dirty="0" smtClean="0">
+                <a:latin typeface="+mn-lt"/>
+              </a:rPr>
+              <a:t>Simulating data</a:t>
+            </a:r>
+          </a:p>
+          <a:p>
+            <a:pPr marL="1143000" lvl="1" indent="-457200">
+              <a:buFont typeface="Arial" panose="020B0604020202020204" pitchFamily="34" charset="0"/>
+              <a:buChar char="•"/>
+            </a:pPr>
+            <a:r>
+              <a:rPr lang="en-GB" sz="1600" dirty="0" smtClean="0">
+                <a:latin typeface="+mn-lt"/>
+              </a:rPr>
+              <a:t>Fitting</a:t>
+            </a:r>
+          </a:p>
+          <a:p>
+            <a:endParaRPr lang="en-GB" sz="2400" dirty="0">
+              <a:latin typeface="+mn-lt"/>
+            </a:endParaRPr>
+          </a:p>
+          <a:p>
+            <a:pPr marL="457200" indent="-457200">
+              <a:buFont typeface="Arial" panose="020B0604020202020204" pitchFamily="34" charset="0"/>
+              <a:buChar char="•"/>
+            </a:pPr>
+            <a:r>
+              <a:rPr lang="en-GB" sz="2400" dirty="0" smtClean="0">
+                <a:latin typeface="+mn-lt"/>
+              </a:rPr>
+              <a:t>Friday</a:t>
+            </a:r>
+          </a:p>
+          <a:p>
+            <a:pPr marL="1143000" lvl="1" indent="-457200">
+              <a:buFont typeface="Arial" panose="020B0604020202020204" pitchFamily="34" charset="0"/>
+              <a:buChar char="•"/>
+            </a:pPr>
+            <a:r>
+              <a:rPr lang="en-GB" sz="1600" dirty="0" smtClean="0">
+                <a:latin typeface="+mn-lt"/>
+              </a:rPr>
+              <a:t>Resolution convolution</a:t>
+            </a:r>
+          </a:p>
+          <a:p>
+            <a:pPr marL="1143000" lvl="1" indent="-457200">
+              <a:buFont typeface="Arial" panose="020B0604020202020204" pitchFamily="34" charset="0"/>
+              <a:buChar char="•"/>
+            </a:pPr>
+            <a:r>
+              <a:rPr lang="en-GB" sz="1600" dirty="0" smtClean="0">
+                <a:latin typeface="+mn-lt"/>
+              </a:rPr>
+              <a:t>Fitting</a:t>
+            </a:r>
+            <a:endParaRPr lang="en-GB" sz="1600" dirty="0">
+              <a:latin typeface="+mn-lt"/>
+            </a:endParaRPr>
+          </a:p>
+        </p:txBody>
+      </p:sp>
+    </p:spTree>
+    <p:extLst>
+      <p:ext uri="{BB962C8B-B14F-4D97-AF65-F5344CB8AC3E}">
+        <p14:creationId xmlns:p14="http://schemas.microsoft.com/office/powerpoint/2010/main" val="1650346348"/>
+      </p:ext>
+    </p:extLst>
+  </p:cSld>
+  <p:clrMapOvr>
+    <a:masterClrMapping/>
+  </p:clrMapOvr>
+  <p:transition spd="med"/>
+  <p:timing>
+    <p:tnLst>
+      <p:par>
+        <p:cTn id="1" dur="indefinite" restart="never" nodeType="tmRoot">
+          <p:childTnLst>
+            <p:seq concurrent="1" nextAc="seek">
+              <p:cTn id="2" dur="indefinite" nodeType="mainSeq">
+                <p:childTnLst>
+                  <p:par>
+                    <p:cTn id="3" fill="hold">
+                      <p:stCondLst>
+                        <p:cond delay="indefinite"/>
+                      </p:stCondLst>
+                      <p:childTnLst>
+                        <p:par>
+                          <p:cTn id="4" fill="hold">
+                            <p:stCondLst>
+                              <p:cond delay="0"/>
+                            </p:stCondLst>
+                            <p:childTnLst>
+                              <p:par>
+                                <p:cTn id="5" presetID="1" presetClass="entr" presetSubtype="0" fill="hold" grpId="0" nodeType="clickEffect">
+                                  <p:stCondLst>
+                                    <p:cond delay="0"/>
+                                  </p:stCondLst>
+                                  <p:childTnLst>
+                                    <p:set>
+                                      <p:cBhvr>
+                                        <p:cTn id="6" dur="1" fill="hold">
+                                          <p:stCondLst>
+                                            <p:cond delay="0"/>
+                                          </p:stCondLst>
+                                        </p:cTn>
+                                        <p:tgtEl>
+                                          <p:spTgt spid="5">
+                                            <p:txEl>
+                                              <p:pRg st="0" end="0"/>
+                                            </p:txEl>
+                                          </p:spTgt>
+                                        </p:tgtEl>
+                                        <p:attrNameLst>
+                                          <p:attrName>style.visibility</p:attrName>
+                                        </p:attrNameLst>
+                                      </p:cBhvr>
+                                      <p:to>
+                                        <p:strVal val="visible"/>
+                                      </p:to>
+                                    </p:set>
+                                  </p:childTnLst>
+                                </p:cTn>
+                              </p:par>
+                              <p:par>
+                                <p:cTn id="7" presetID="1" presetClass="entr" presetSubtype="0" fill="hold" grpId="0" nodeType="withEffect">
+                                  <p:stCondLst>
+                                    <p:cond delay="0"/>
+                                  </p:stCondLst>
+                                  <p:childTnLst>
+                                    <p:set>
+                                      <p:cBhvr>
+                                        <p:cTn id="8" dur="1" fill="hold">
+                                          <p:stCondLst>
+                                            <p:cond delay="0"/>
+                                          </p:stCondLst>
+                                        </p:cTn>
+                                        <p:tgtEl>
+                                          <p:spTgt spid="5">
+                                            <p:txEl>
+                                              <p:pRg st="1" end="1"/>
+                                            </p:txEl>
+                                          </p:spTgt>
+                                        </p:tgtEl>
+                                        <p:attrNameLst>
+                                          <p:attrName>style.visibility</p:attrName>
+                                        </p:attrNameLst>
+                                      </p:cBhvr>
+                                      <p:to>
+                                        <p:strVal val="visible"/>
+                                      </p:to>
+                                    </p:set>
+                                  </p:childTnLst>
+                                </p:cTn>
+                              </p:par>
+                              <p:par>
+                                <p:cTn id="9" presetID="1" presetClass="entr" presetSubtype="0" fill="hold" grpId="0" nodeType="withEffect">
+                                  <p:stCondLst>
+                                    <p:cond delay="0"/>
+                                  </p:stCondLst>
+                                  <p:childTnLst>
+                                    <p:set>
+                                      <p:cBhvr>
+                                        <p:cTn id="10" dur="1" fill="hold">
+                                          <p:stCondLst>
+                                            <p:cond delay="0"/>
+                                          </p:stCondLst>
+                                        </p:cTn>
+                                        <p:tgtEl>
+                                          <p:spTgt spid="5">
+                                            <p:txEl>
+                                              <p:pRg st="2" end="2"/>
+                                            </p:txEl>
+                                          </p:spTgt>
+                                        </p:tgtEl>
+                                        <p:attrNameLst>
+                                          <p:attrName>style.visibility</p:attrName>
+                                        </p:attrNameLst>
+                                      </p:cBhvr>
+                                      <p:to>
+                                        <p:strVal val="visible"/>
+                                      </p:to>
+                                    </p:set>
+                                  </p:childTnLst>
+                                </p:cTn>
+                              </p:par>
+                              <p:par>
+                                <p:cTn id="11" presetID="1" presetClass="entr" presetSubtype="0" fill="hold" grpId="0" nodeType="withEffect">
+                                  <p:stCondLst>
+                                    <p:cond delay="0"/>
+                                  </p:stCondLst>
+                                  <p:childTnLst>
+                                    <p:set>
+                                      <p:cBhvr>
+                                        <p:cTn id="12" dur="1" fill="hold">
+                                          <p:stCondLst>
+                                            <p:cond delay="0"/>
+                                          </p:stCondLst>
+                                        </p:cTn>
+                                        <p:tgtEl>
+                                          <p:spTgt spid="5">
+                                            <p:txEl>
+                                              <p:pRg st="3" end="3"/>
+                                            </p:txEl>
+                                          </p:spTgt>
+                                        </p:tgtEl>
+                                        <p:attrNameLst>
+                                          <p:attrName>style.visibility</p:attrName>
+                                        </p:attrNameLst>
+                                      </p:cBhvr>
+                                      <p:to>
+                                        <p:strVal val="visible"/>
+                                      </p:to>
+                                    </p:set>
+                                  </p:childTnLst>
+                                </p:cTn>
+                              </p:par>
+                              <p:par>
+                                <p:cTn id="13" presetID="1" presetClass="entr" presetSubtype="0" fill="hold" grpId="0" nodeType="withEffect">
+                                  <p:stCondLst>
+                                    <p:cond delay="0"/>
+                                  </p:stCondLst>
+                                  <p:childTnLst>
+                                    <p:set>
+                                      <p:cBhvr>
+                                        <p:cTn id="14" dur="1" fill="hold">
+                                          <p:stCondLst>
+                                            <p:cond delay="0"/>
+                                          </p:stCondLst>
+                                        </p:cTn>
+                                        <p:tgtEl>
+                                          <p:spTgt spid="5">
+                                            <p:txEl>
+                                              <p:pRg st="4" end="4"/>
+                                            </p:txEl>
+                                          </p:spTgt>
+                                        </p:tgtEl>
+                                        <p:attrNameLst>
+                                          <p:attrName>style.visibility</p:attrName>
+                                        </p:attrNameLst>
+                                      </p:cBhvr>
+                                      <p:to>
+                                        <p:strVal val="visible"/>
+                                      </p:to>
+                                    </p:set>
+                                  </p:childTnLst>
+                                </p:cTn>
+                              </p:par>
+                              <p:par>
+                                <p:cTn id="15" presetID="1" presetClass="entr" presetSubtype="0" fill="hold" grpId="0" nodeType="withEffect">
+                                  <p:stCondLst>
+                                    <p:cond delay="0"/>
+                                  </p:stCondLst>
+                                  <p:childTnLst>
+                                    <p:set>
+                                      <p:cBhvr>
+                                        <p:cTn id="16" dur="1" fill="hold">
+                                          <p:stCondLst>
+                                            <p:cond delay="0"/>
+                                          </p:stCondLst>
+                                        </p:cTn>
+                                        <p:tgtEl>
+                                          <p:spTgt spid="5">
+                                            <p:txEl>
+                                              <p:pRg st="5" end="5"/>
+                                            </p:txEl>
+                                          </p:spTgt>
+                                        </p:tgtEl>
+                                        <p:attrNameLst>
+                                          <p:attrName>style.visibility</p:attrName>
+                                        </p:attrNameLst>
+                                      </p:cBhvr>
+                                      <p:to>
+                                        <p:strVal val="visible"/>
+                                      </p:to>
+                                    </p:set>
+                                  </p:childTnLst>
+                                </p:cTn>
+                              </p:par>
+                            </p:childTnLst>
+                          </p:cTn>
+                        </p:par>
+                      </p:childTnLst>
+                    </p:cTn>
+                  </p:par>
+                  <p:par>
+                    <p:cTn id="17" fill="hold">
+                      <p:stCondLst>
+                        <p:cond delay="indefinite"/>
+                      </p:stCondLst>
+                      <p:childTnLst>
+                        <p:par>
+                          <p:cTn id="18" fill="hold">
+                            <p:stCondLst>
+                              <p:cond delay="0"/>
+                            </p:stCondLst>
+                            <p:childTnLst>
+                              <p:par>
+                                <p:cTn id="19" presetID="1" presetClass="entr" presetSubtype="0" fill="hold" grpId="0" nodeType="clickEffect">
+                                  <p:stCondLst>
+                                    <p:cond delay="0"/>
+                                  </p:stCondLst>
+                                  <p:childTnLst>
+                                    <p:set>
+                                      <p:cBhvr>
+                                        <p:cTn id="20" dur="1" fill="hold">
+                                          <p:stCondLst>
+                                            <p:cond delay="0"/>
+                                          </p:stCondLst>
+                                        </p:cTn>
+                                        <p:tgtEl>
+                                          <p:spTgt spid="5">
+                                            <p:txEl>
+                                              <p:pRg st="7" end="7"/>
+                                            </p:txEl>
+                                          </p:spTgt>
+                                        </p:tgtEl>
+                                        <p:attrNameLst>
+                                          <p:attrName>style.visibility</p:attrName>
+                                        </p:attrNameLst>
+                                      </p:cBhvr>
+                                      <p:to>
+                                        <p:strVal val="visible"/>
+                                      </p:to>
+                                    </p:set>
+                                  </p:childTnLst>
+                                </p:cTn>
+                              </p:par>
+                              <p:par>
+                                <p:cTn id="21" presetID="1" presetClass="entr" presetSubtype="0" fill="hold" grpId="0" nodeType="withEffect">
+                                  <p:stCondLst>
+                                    <p:cond delay="0"/>
+                                  </p:stCondLst>
+                                  <p:childTnLst>
+                                    <p:set>
+                                      <p:cBhvr>
+                                        <p:cTn id="22" dur="1" fill="hold">
+                                          <p:stCondLst>
+                                            <p:cond delay="0"/>
+                                          </p:stCondLst>
+                                        </p:cTn>
+                                        <p:tgtEl>
+                                          <p:spTgt spid="5">
+                                            <p:txEl>
+                                              <p:pRg st="8" end="8"/>
+                                            </p:txEl>
+                                          </p:spTgt>
+                                        </p:tgtEl>
+                                        <p:attrNameLst>
+                                          <p:attrName>style.visibility</p:attrName>
+                                        </p:attrNameLst>
+                                      </p:cBhvr>
+                                      <p:to>
+                                        <p:strVal val="visible"/>
+                                      </p:to>
+                                    </p:set>
+                                  </p:childTnLst>
+                                </p:cTn>
+                              </p:par>
+                              <p:par>
+                                <p:cTn id="23" presetID="1" presetClass="entr" presetSubtype="0" fill="hold" grpId="0" nodeType="withEffect">
+                                  <p:stCondLst>
+                                    <p:cond delay="0"/>
+                                  </p:stCondLst>
+                                  <p:childTnLst>
+                                    <p:set>
+                                      <p:cBhvr>
+                                        <p:cTn id="24" dur="1" fill="hold">
+                                          <p:stCondLst>
+                                            <p:cond delay="0"/>
+                                          </p:stCondLst>
+                                        </p:cTn>
+                                        <p:tgtEl>
+                                          <p:spTgt spid="5">
+                                            <p:txEl>
+                                              <p:pRg st="9" end="9"/>
+                                            </p:txEl>
+                                          </p:spTgt>
+                                        </p:tgtEl>
+                                        <p:attrNameLst>
+                                          <p:attrName>style.visibility</p:attrName>
+                                        </p:attrNameLst>
+                                      </p:cBhvr>
+                                      <p:to>
+                                        <p:strVal val="visible"/>
+                                      </p:to>
+                                    </p:set>
+                                  </p:childTnLst>
+                                </p:cTn>
+                              </p:par>
+                            </p:childTnLst>
+                          </p:cTn>
+                        </p:par>
+                      </p:childTnLst>
+                    </p:cTn>
+                  </p:par>
+                </p:childTnLst>
+              </p:cTn>
+              <p:prevCondLst>
+                <p:cond evt="onPrev" delay="0">
+                  <p:tgtEl>
+                    <p:sldTgt/>
+                  </p:tgtEl>
+                </p:cond>
+              </p:prevCondLst>
+              <p:nextCondLst>
+                <p:cond evt="onNext" delay="0">
+                  <p:tgtEl>
+                    <p:sldTgt/>
+                  </p:tgtEl>
+                </p:cond>
+              </p:nextCondLst>
+            </p:seq>
+          </p:childTnLst>
+        </p:cTn>
+      </p:par>
+    </p:tnLst>
+    <p:bldLst>
+      <p:bldP spid="5" grpId="0" build="p"/>
+    </p:bldLst>
+  </p:timing>
+</p:sld>
+</file>
+
 <file path=ppt/slides/slide3.xml><?xml version="1.0" encoding="utf-8"?>
 <p:sld xmlns:a="http://schemas.openxmlformats.org/drawingml/2006/main" xmlns:r="http://schemas.openxmlformats.org/officeDocument/2006/relationships" xmlns:p="http://schemas.openxmlformats.org/presentationml/2006/main">
   <p:cSld>
@@ -24626,7 +25284,7 @@
                 <a:latin typeface="Courier New" panose="02070309020205020404" pitchFamily="49" charset="0"/>
                 <a:cs typeface="Courier New" panose="02070309020205020404" pitchFamily="49" charset="0"/>
               </a:rPr>
-              <a:t>&gt;&gt; [1,0; 0,1] * [1,2; 3,4]   % result: [1,2; 0 0]</a:t>
+              <a:t>&gt;&gt; [1,0; 0,0] * [1,2; 3,4]   % result: [1,2; 0 0]</a:t>
             </a:r>
           </a:p>
           <a:p>
@@ -24638,7 +25296,7 @@
                 <a:latin typeface="Courier New" panose="02070309020205020404" pitchFamily="49" charset="0"/>
                 <a:cs typeface="Courier New" panose="02070309020205020404" pitchFamily="49" charset="0"/>
               </a:rPr>
-              <a:t>&gt;&gt; [1,0; 0,1] .* [1,2; 3,4]  % result: [1,0; 0 0]</a:t>
+              <a:t>&gt;&gt; [1,0; 0,0] .* [1,2; 3,4]  % result: [1,0; 0 0]</a:t>
             </a:r>
           </a:p>
           <a:p>
@@ -27426,6 +28084,51 @@
                       </p:childTnLst>
                     </p:cTn>
                   </p:par>
+                  <p:par>
+                    <p:cTn id="41" fill="hold">
+                      <p:stCondLst>
+                        <p:cond delay="indefinite"/>
+                      </p:stCondLst>
+                      <p:childTnLst>
+                        <p:par>
+                          <p:cTn id="42" fill="hold">
+                            <p:stCondLst>
+                              <p:cond delay="0"/>
+                            </p:stCondLst>
+                            <p:childTnLst>
+                              <p:par>
+                                <p:cTn id="43" presetID="1" presetClass="entr" presetSubtype="0" fill="hold" grpId="0" nodeType="clickEffect">
+                                  <p:stCondLst>
+                                    <p:cond delay="0"/>
+                                  </p:stCondLst>
+                                  <p:childTnLst>
+                                    <p:set>
+                                      <p:cBhvr>
+                                        <p:cTn id="44" dur="1" fill="hold">
+                                          <p:stCondLst>
+                                            <p:cond delay="0"/>
+                                          </p:stCondLst>
+                                        </p:cTn>
+                                        <p:tgtEl>
+                                          <p:spTgt spid="2"/>
+                                        </p:tgtEl>
+                                        <p:attrNameLst>
+                                          <p:attrName>style.visibility</p:attrName>
+                                        </p:attrNameLst>
+                                      </p:cBhvr>
+                                      <p:to>
+                                        <p:strVal val="visible"/>
+                                      </p:to>
+                                    </p:set>
+                                  </p:childTnLst>
+                                </p:cTn>
+                              </p:par>
+                            </p:childTnLst>
+                          </p:cTn>
+                        </p:par>
+                      </p:childTnLst>
+                    </p:cTn>
+                  </p:par>
                 </p:childTnLst>
               </p:cTn>
               <p:prevCondLst>
@@ -27449,6 +28152,7 @@
     </p:tnLst>
     <p:bldLst>
       <p:bldP spid="3" grpId="0" uiExpand="1" build="p"/>
+      <p:bldP spid="2" grpId="0"/>
     </p:bldLst>
   </p:timing>
 </p:sld>

</xml_diff>

<commit_message>
Add day 4 slides. Clarify day 3 worksheet Q1
</commit_message>
<xml_diff>
--- a/presentations/edatc21_slides_03_horace1.pptx
+++ b/presentations/edatc21_slides_03_horace1.pptx
@@ -6847,7 +6847,6 @@
               <a:rPr lang="en-US" sz="4800" dirty="0" smtClean="0"/>
               <a:t>Part 1</a:t>
             </a:r>
-            <a:endParaRPr lang="en-US" sz="4800" dirty="0" smtClean="0"/>
           </a:p>
         </p:txBody>
       </p:sp>
@@ -8218,10 +8217,6 @@
               </a:rPr>
               <a:t>)</a:t>
             </a:r>
-            <a:endParaRPr lang="en-GB" sz="1900" dirty="0">
-              <a:latin typeface="Courier New" panose="02070309020205020404" pitchFamily="49" charset="0"/>
-              <a:cs typeface="Courier New" panose="02070309020205020404" pitchFamily="49" charset="0"/>
-            </a:endParaRPr>
           </a:p>
           <a:p>
             <a:pPr marL="358775" indent="-358775">
@@ -12767,13 +12762,7 @@
               <a:rPr lang="en-GB" sz="1600" dirty="0" smtClean="0">
                 <a:latin typeface="+mn-lt"/>
               </a:rPr>
-              <a:t>-</a:t>
-            </a:r>
-            <a:r>
-              <a:rPr lang="en-GB" sz="1600" dirty="0" smtClean="0">
-                <a:latin typeface="+mn-lt"/>
-              </a:rPr>
-              <a:t>axes for cuts</a:t>
+              <a:t>-axes for cuts</a:t>
             </a:r>
           </a:p>
           <a:p>
@@ -12823,9 +12812,6 @@
               </a:rPr>
               <a:t> which define the 3 Q axes for cuts/plots.</a:t>
             </a:r>
-            <a:endParaRPr lang="en-GB" sz="2000" dirty="0" smtClean="0">
-              <a:latin typeface="+mn-lt"/>
-            </a:endParaRPr>
           </a:p>
           <a:p>
             <a:pPr marL="342900" indent="-342900">
@@ -17040,9 +17026,6 @@
               </a:rPr>
               <a:t>Objects and methods</a:t>
             </a:r>
-            <a:endParaRPr lang="en-GB" sz="1600" dirty="0" smtClean="0">
-              <a:latin typeface="+mn-lt"/>
-            </a:endParaRPr>
           </a:p>
           <a:p>
             <a:pPr marL="457200" indent="-457200">
@@ -17517,14 +17500,6 @@
               </a:rPr>
               <a:t>Objects and methods</a:t>
             </a:r>
-            <a:endParaRPr lang="en-GB" sz="1600" dirty="0" smtClean="0">
-              <a:solidFill>
-                <a:schemeClr val="bg2">
-                  <a:lumMod val="90000"/>
-                </a:schemeClr>
-              </a:solidFill>
-              <a:latin typeface="+mn-lt"/>
-            </a:endParaRPr>
           </a:p>
           <a:p>
             <a:pPr marL="457200" indent="-457200">
@@ -18158,13 +18133,7 @@
               <a:rPr lang="en-GB" sz="2000" dirty="0" smtClean="0">
                 <a:latin typeface="+mn-lt"/>
               </a:rPr>
-              <a:t>– applies correction matri</a:t>
-            </a:r>
-            <a:r>
-              <a:rPr lang="en-GB" sz="2000" dirty="0" smtClean="0">
-                <a:latin typeface="+mn-lt"/>
-              </a:rPr>
-              <a:t>x to </a:t>
+              <a:t>– applies correction matrix to </a:t>
             </a:r>
             <a:r>
               <a:rPr lang="en-GB" sz="2000" dirty="0" err="1" smtClean="0">
@@ -20918,10 +20887,6 @@
               </a:rPr>
               <a:t>',0.1)</a:t>
             </a:r>
-            <a:endParaRPr lang="en-GB" sz="1800" dirty="0">
-              <a:latin typeface="Courier New" panose="02070309020205020404" pitchFamily="49" charset="0"/>
-              <a:cs typeface="Courier New" panose="02070309020205020404" pitchFamily="49" charset="0"/>
-            </a:endParaRPr>
           </a:p>
         </p:txBody>
       </p:sp>
@@ -21345,15 +21310,7 @@
             <a:pPr algn="ctr"/>
             <a:r>
               <a:rPr lang="en-GB" dirty="0" smtClean="0"/>
-              <a:t>Horace </a:t>
-            </a:r>
-            <a:r>
-              <a:rPr lang="en-GB" dirty="0" smtClean="0"/>
-              <a:t>CLI </a:t>
-            </a:r>
-            <a:r>
-              <a:rPr lang="en-GB" dirty="0" smtClean="0"/>
-              <a:t>Demonstration</a:t>
+              <a:t>Horace CLI Demonstration</a:t>
             </a:r>
             <a:endParaRPr lang="en-GB" dirty="0"/>
           </a:p>
@@ -21481,31 +21438,7 @@
                 <a:ea typeface="Arial" pitchFamily="34"/>
                 <a:cs typeface="Arial" pitchFamily="34"/>
               </a:rPr>
-              <a:t>Horace </a:t>
-            </a:r>
-            <a:r>
-              <a:rPr lang="en-US" sz="3000" i="0" u="none" strike="noStrike" kern="1200" cap="none" spc="0" baseline="0" dirty="0" smtClean="0">
-                <a:solidFill>
-                  <a:srgbClr val="FFFFFF"/>
-                </a:solidFill>
-                <a:uFillTx/>
-                <a:latin typeface="Lucida Sans" pitchFamily="34"/>
-                <a:ea typeface="Arial" pitchFamily="34"/>
-                <a:cs typeface="Arial" pitchFamily="34"/>
-              </a:rPr>
-              <a:t>CLI </a:t>
-            </a:r>
-            <a:r>
-              <a:rPr lang="en-US" sz="3000" i="0" u="none" strike="noStrike" kern="1200" cap="none" spc="0" baseline="0" dirty="0" smtClean="0">
-                <a:solidFill>
-                  <a:srgbClr val="FFFFFF"/>
-                </a:solidFill>
-                <a:uFillTx/>
-                <a:latin typeface="Lucida Sans" pitchFamily="34"/>
-                <a:ea typeface="Arial" pitchFamily="34"/>
-                <a:cs typeface="Arial" pitchFamily="34"/>
-              </a:rPr>
-              <a:t>Demonstration</a:t>
+              <a:t>Horace CLI Demonstration</a:t>
             </a:r>
             <a:endParaRPr lang="en-US" sz="3000" b="0" i="0" u="none" strike="noStrike" kern="1200" cap="none" spc="0" baseline="0" dirty="0">
               <a:solidFill>
@@ -22504,18 +22437,6 @@
             </a:r>
           </a:p>
           <a:p>
-            <a:pPr marL="1143000" lvl="1" indent="-457200">
-              <a:buFont typeface="Arial" panose="020B0604020202020204" pitchFamily="34" charset="0"/>
-              <a:buChar char="•"/>
-            </a:pPr>
-            <a:r>
-              <a:rPr lang="en-GB" sz="1600" dirty="0" smtClean="0">
-                <a:latin typeface="+mn-lt"/>
-              </a:rPr>
-              <a:t>Fitting</a:t>
-            </a:r>
-          </a:p>
-          <a:p>
             <a:endParaRPr lang="en-GB" sz="2400" dirty="0">
               <a:latin typeface="+mn-lt"/>
             </a:endParaRPr>
@@ -22747,15 +22668,33 @@
                                   </p:childTnLst>
                                 </p:cTn>
                               </p:par>
+                            </p:childTnLst>
+                          </p:cTn>
+                        </p:par>
+                      </p:childTnLst>
+                    </p:cTn>
+                  </p:par>
+                  <p:par>
+                    <p:cTn id="15" fill="hold">
+                      <p:stCondLst>
+                        <p:cond delay="indefinite"/>
+                      </p:stCondLst>
+                      <p:childTnLst>
+                        <p:par>
+                          <p:cTn id="16" fill="hold">
+                            <p:stCondLst>
+                              <p:cond delay="0"/>
+                            </p:stCondLst>
+                            <p:childTnLst>
                               <p:par>
-                                <p:cTn id="15" presetID="1" presetClass="entr" presetSubtype="0" fill="hold" grpId="0" nodeType="withEffect">
+                                <p:cTn id="17" presetID="1" presetClass="entr" presetSubtype="0" fill="hold" grpId="0" nodeType="clickEffect">
                                   <p:stCondLst>
                                     <p:cond delay="0"/>
                                   </p:stCondLst>
                                   <p:childTnLst>
                                     <p:set>
                                       <p:cBhvr>
-                                        <p:cTn id="16" dur="1" fill="hold">
+                                        <p:cTn id="18" dur="1" fill="hold">
                                           <p:stCondLst>
                                             <p:cond delay="0"/>
                                           </p:stCondLst>
@@ -22763,7 +22702,7 @@
                                         <p:tgtEl>
                                           <p:spTgt spid="5">
                                             <p:txEl>
-                                              <p:pRg st="5" end="5"/>
+                                              <p:pRg st="6" end="6"/>
                                             </p:txEl>
                                           </p:spTgt>
                                         </p:tgtEl>
@@ -22778,26 +22717,8 @@
                                   </p:childTnLst>
                                 </p:cTn>
                               </p:par>
-                            </p:childTnLst>
-                          </p:cTn>
-                        </p:par>
-                      </p:childTnLst>
-                    </p:cTn>
-                  </p:par>
-                  <p:par>
-                    <p:cTn id="17" fill="hold">
-                      <p:stCondLst>
-                        <p:cond delay="indefinite"/>
-                      </p:stCondLst>
-                      <p:childTnLst>
-                        <p:par>
-                          <p:cTn id="18" fill="hold">
-                            <p:stCondLst>
-                              <p:cond delay="0"/>
-                            </p:stCondLst>
-                            <p:childTnLst>
                               <p:par>
-                                <p:cTn id="19" presetID="1" presetClass="entr" presetSubtype="0" fill="hold" grpId="0" nodeType="clickEffect">
+                                <p:cTn id="19" presetID="1" presetClass="entr" presetSubtype="0" fill="hold" grpId="0" nodeType="withEffect">
                                   <p:stCondLst>
                                     <p:cond delay="0"/>
                                   </p:stCondLst>
@@ -22844,37 +22765,6 @@
                                           <p:spTgt spid="5">
                                             <p:txEl>
                                               <p:pRg st="8" end="8"/>
-                                            </p:txEl>
-                                          </p:spTgt>
-                                        </p:tgtEl>
-                                        <p:attrNameLst>
-                                          <p:attrName>style.visibility</p:attrName>
-                                        </p:attrNameLst>
-                                      </p:cBhvr>
-                                      <p:to>
-                                        <p:strVal val="visible"/>
-                                      </p:to>
-                                    </p:set>
-                                  </p:childTnLst>
-                                </p:cTn>
-                              </p:par>
-                              <p:par>
-                                <p:cTn id="23" presetID="1" presetClass="entr" presetSubtype="0" fill="hold" grpId="0" nodeType="withEffect">
-                                  <p:stCondLst>
-                                    <p:cond delay="0"/>
-                                  </p:stCondLst>
-                                  <p:childTnLst>
-                                    <p:set>
-                                      <p:cBhvr>
-                                        <p:cTn id="24" dur="1" fill="hold">
-                                          <p:stCondLst>
-                                            <p:cond delay="0"/>
-                                          </p:stCondLst>
-                                        </p:cTn>
-                                        <p:tgtEl>
-                                          <p:spTgt spid="5">
-                                            <p:txEl>
-                                              <p:pRg st="9" end="9"/>
                                             </p:txEl>
                                           </p:spTgt>
                                         </p:tgtEl>
@@ -24125,6 +24015,84 @@
               </a:rPr>
               <a:t>&gt;&gt; column_1d = [1;2;3;4]</a:t>
             </a:r>
+          </a:p>
+          <a:p>
+            <a:pPr marL="457200" lvl="1" indent="0">
+              <a:buNone/>
+            </a:pPr>
+            <a:r>
+              <a:rPr lang="en-GB" sz="1600" dirty="0" smtClean="0">
+                <a:latin typeface="Courier New" panose="02070309020205020404" pitchFamily="49" charset="0"/>
+                <a:cs typeface="Courier New" panose="02070309020205020404" pitchFamily="49" charset="0"/>
+              </a:rPr>
+              <a:t>&gt;&gt; array_2d = [1,2,3; 4,5,6; 7,8,9]</a:t>
+            </a:r>
+          </a:p>
+          <a:p>
+            <a:pPr marL="457200" lvl="1" indent="0">
+              <a:buNone/>
+            </a:pPr>
+            <a:r>
+              <a:rPr lang="en-GB" sz="1600" dirty="0" smtClean="0">
+                <a:latin typeface="Courier New" panose="02070309020205020404" pitchFamily="49" charset="0"/>
+                <a:cs typeface="Courier New" panose="02070309020205020404" pitchFamily="49" charset="0"/>
+              </a:rPr>
+              <a:t>&gt;&gt; string </a:t>
+            </a:r>
+            <a:r>
+              <a:rPr lang="en-GB" sz="1600" dirty="0">
+                <a:latin typeface="Courier New" panose="02070309020205020404" pitchFamily="49" charset="0"/>
+                <a:cs typeface="Courier New" panose="02070309020205020404" pitchFamily="49" charset="0"/>
+              </a:rPr>
+              <a:t>= </a:t>
+            </a:r>
+            <a:r>
+              <a:rPr lang="en-GB" sz="1600" dirty="0" smtClean="0">
+                <a:latin typeface="Courier New" panose="02070309020205020404" pitchFamily="49" charset="0"/>
+                <a:cs typeface="Courier New" panose="02070309020205020404" pitchFamily="49" charset="0"/>
+              </a:rPr>
+              <a:t>'</a:t>
+            </a:r>
+            <a:r>
+              <a:rPr lang="en-GB" sz="1600" dirty="0" err="1" smtClean="0">
+                <a:latin typeface="Courier New" panose="02070309020205020404" pitchFamily="49" charset="0"/>
+                <a:cs typeface="Courier New" panose="02070309020205020404" pitchFamily="49" charset="0"/>
+              </a:rPr>
+              <a:t>abc</a:t>
+            </a:r>
+            <a:r>
+              <a:rPr lang="en-GB" sz="1600" dirty="0" smtClean="0">
+                <a:latin typeface="Courier New" panose="02070309020205020404" pitchFamily="49" charset="0"/>
+                <a:cs typeface="Courier New" panose="02070309020205020404" pitchFamily="49" charset="0"/>
+              </a:rPr>
+              <a:t>'</a:t>
+            </a:r>
+          </a:p>
+          <a:p>
+            <a:pPr marL="457200" lvl="1" indent="0">
+              <a:buNone/>
+            </a:pPr>
+            <a:r>
+              <a:rPr lang="en-GB" sz="1600" dirty="0">
+                <a:latin typeface="Courier New" panose="02070309020205020404" pitchFamily="49" charset="0"/>
+                <a:cs typeface="Courier New" panose="02070309020205020404" pitchFamily="49" charset="0"/>
+              </a:rPr>
+              <a:t>&gt;&gt; string = [</a:t>
+            </a:r>
+            <a:r>
+              <a:rPr lang="en-GB" sz="1600" dirty="0" smtClean="0">
+                <a:latin typeface="Courier New" panose="02070309020205020404" pitchFamily="49" charset="0"/>
+                <a:cs typeface="Courier New" panose="02070309020205020404" pitchFamily="49" charset="0"/>
+              </a:rPr>
+              <a:t>'xyz' </a:t>
+            </a:r>
+            <a:r>
+              <a:rPr lang="en-GB" sz="1600" dirty="0">
+                <a:latin typeface="Courier New" panose="02070309020205020404" pitchFamily="49" charset="0"/>
+                <a:cs typeface="Courier New" panose="02070309020205020404" pitchFamily="49" charset="0"/>
+              </a:rPr>
+              <a:t>num2str(5)]   % 'xyz5'</a:t>
+            </a:r>
             <a:endParaRPr lang="en-GB" sz="1600" dirty="0" smtClean="0">
               <a:latin typeface="Courier New" panose="02070309020205020404" pitchFamily="49" charset="0"/>
               <a:cs typeface="Courier New" panose="02070309020205020404" pitchFamily="49" charset="0"/>
@@ -24139,115 +24107,29 @@
                 <a:latin typeface="Courier New" panose="02070309020205020404" pitchFamily="49" charset="0"/>
                 <a:cs typeface="Courier New" panose="02070309020205020404" pitchFamily="49" charset="0"/>
               </a:rPr>
-              <a:t>&gt;&gt; array_2d = [1,2,3; 4,5,6; 7,8,9]</a:t>
-            </a:r>
-          </a:p>
-          <a:p>
-            <a:pPr marL="457200" lvl="1" indent="0">
-              <a:buNone/>
-            </a:pPr>
+              <a:t>&gt;&gt; </a:t>
+            </a:r>
+            <a:r>
+              <a:rPr lang="en-GB" sz="1600" dirty="0" err="1" smtClean="0">
+                <a:latin typeface="Courier New" panose="02070309020205020404" pitchFamily="49" charset="0"/>
+                <a:cs typeface="Courier New" panose="02070309020205020404" pitchFamily="49" charset="0"/>
+              </a:rPr>
+              <a:t>cell_array</a:t>
+            </a:r>
+            <a:r>
+              <a:rPr lang="en-GB" sz="1600" dirty="0">
+                <a:latin typeface="Courier New" panose="02070309020205020404" pitchFamily="49" charset="0"/>
+                <a:cs typeface="Courier New" panose="02070309020205020404" pitchFamily="49" charset="0"/>
+              </a:rPr>
+              <a:t> = {'a', [1,2,3], </a:t>
+            </a:r>
             <a:r>
               <a:rPr lang="en-GB" sz="1600" dirty="0" smtClean="0">
                 <a:latin typeface="Courier New" panose="02070309020205020404" pitchFamily="49" charset="0"/>
                 <a:cs typeface="Courier New" panose="02070309020205020404" pitchFamily="49" charset="0"/>
               </a:rPr>
-              <a:t>&gt;&gt; string </a:t>
-            </a:r>
-            <a:r>
-              <a:rPr lang="en-GB" sz="1600" dirty="0">
-                <a:latin typeface="Courier New" panose="02070309020205020404" pitchFamily="49" charset="0"/>
-                <a:cs typeface="Courier New" panose="02070309020205020404" pitchFamily="49" charset="0"/>
-              </a:rPr>
-              <a:t>= </a:t>
-            </a:r>
-            <a:r>
-              <a:rPr lang="en-GB" sz="1600" dirty="0" smtClean="0">
-                <a:latin typeface="Courier New" panose="02070309020205020404" pitchFamily="49" charset="0"/>
-                <a:cs typeface="Courier New" panose="02070309020205020404" pitchFamily="49" charset="0"/>
-              </a:rPr>
-              <a:t>'</a:t>
-            </a:r>
-            <a:r>
-              <a:rPr lang="en-GB" sz="1600" dirty="0" err="1" smtClean="0">
-                <a:latin typeface="Courier New" panose="02070309020205020404" pitchFamily="49" charset="0"/>
-                <a:cs typeface="Courier New" panose="02070309020205020404" pitchFamily="49" charset="0"/>
-              </a:rPr>
-              <a:t>abc</a:t>
-            </a:r>
-            <a:r>
-              <a:rPr lang="en-GB" sz="1600" dirty="0" smtClean="0">
-                <a:latin typeface="Courier New" panose="02070309020205020404" pitchFamily="49" charset="0"/>
-                <a:cs typeface="Courier New" panose="02070309020205020404" pitchFamily="49" charset="0"/>
-              </a:rPr>
-              <a:t>'</a:t>
-            </a:r>
-          </a:p>
-          <a:p>
-            <a:pPr marL="457200" lvl="1" indent="0">
-              <a:buNone/>
-            </a:pPr>
-            <a:r>
-              <a:rPr lang="en-GB" sz="1600" dirty="0">
-                <a:latin typeface="Courier New" panose="02070309020205020404" pitchFamily="49" charset="0"/>
-                <a:cs typeface="Courier New" panose="02070309020205020404" pitchFamily="49" charset="0"/>
-              </a:rPr>
-              <a:t>&gt;&gt; string = [</a:t>
-            </a:r>
-            <a:r>
-              <a:rPr lang="en-GB" sz="1600" dirty="0" smtClean="0">
-                <a:latin typeface="Courier New" panose="02070309020205020404" pitchFamily="49" charset="0"/>
-                <a:cs typeface="Courier New" panose="02070309020205020404" pitchFamily="49" charset="0"/>
-              </a:rPr>
-              <a:t>'xyz' </a:t>
-            </a:r>
-            <a:r>
-              <a:rPr lang="en-GB" sz="1600" dirty="0">
-                <a:latin typeface="Courier New" panose="02070309020205020404" pitchFamily="49" charset="0"/>
-                <a:cs typeface="Courier New" panose="02070309020205020404" pitchFamily="49" charset="0"/>
-              </a:rPr>
-              <a:t>num2str(5)]   % 'xyz5'</a:t>
-            </a:r>
-            <a:endParaRPr lang="en-GB" sz="1600" dirty="0" smtClean="0">
-              <a:latin typeface="Courier New" panose="02070309020205020404" pitchFamily="49" charset="0"/>
-              <a:cs typeface="Courier New" panose="02070309020205020404" pitchFamily="49" charset="0"/>
-            </a:endParaRPr>
-          </a:p>
-          <a:p>
-            <a:pPr marL="457200" lvl="1" indent="0">
-              <a:buNone/>
-            </a:pPr>
-            <a:r>
-              <a:rPr lang="en-GB" sz="1600" dirty="0" smtClean="0">
-                <a:latin typeface="Courier New" panose="02070309020205020404" pitchFamily="49" charset="0"/>
-                <a:cs typeface="Courier New" panose="02070309020205020404" pitchFamily="49" charset="0"/>
-              </a:rPr>
-              <a:t>&gt;&gt; </a:t>
-            </a:r>
-            <a:r>
-              <a:rPr lang="en-GB" sz="1600" dirty="0" err="1" smtClean="0">
-                <a:latin typeface="Courier New" panose="02070309020205020404" pitchFamily="49" charset="0"/>
-                <a:cs typeface="Courier New" panose="02070309020205020404" pitchFamily="49" charset="0"/>
-              </a:rPr>
-              <a:t>cell_array</a:t>
-            </a:r>
-            <a:r>
-              <a:rPr lang="en-GB" sz="1600" dirty="0">
-                <a:latin typeface="Courier New" panose="02070309020205020404" pitchFamily="49" charset="0"/>
-                <a:cs typeface="Courier New" panose="02070309020205020404" pitchFamily="49" charset="0"/>
-              </a:rPr>
-              <a:t> = {'a', [1,2,3], </a:t>
-            </a:r>
-            <a:r>
-              <a:rPr lang="en-GB" sz="1600" dirty="0" smtClean="0">
-                <a:latin typeface="Courier New" panose="02070309020205020404" pitchFamily="49" charset="0"/>
-                <a:cs typeface="Courier New" panose="02070309020205020404" pitchFamily="49" charset="0"/>
-              </a:rPr>
               <a:t>'xyz'}</a:t>
             </a:r>
-            <a:endParaRPr lang="en-GB" sz="1600" dirty="0" smtClean="0">
-              <a:latin typeface="Courier New" panose="02070309020205020404" pitchFamily="49" charset="0"/>
-              <a:cs typeface="Courier New" panose="02070309020205020404" pitchFamily="49" charset="0"/>
-            </a:endParaRPr>
           </a:p>
           <a:p>
             <a:pPr marL="342900" indent="-342900">
@@ -25320,21 +25202,7 @@
                 <a:latin typeface="Courier New" panose="02070309020205020404" pitchFamily="49" charset="0"/>
                 <a:cs typeface="Courier New" panose="02070309020205020404" pitchFamily="49" charset="0"/>
               </a:rPr>
-              <a:t>&gt;&gt; [1,0; </a:t>
-            </a:r>
-            <a:r>
-              <a:rPr lang="en-GB" sz="1600" dirty="0" smtClean="0">
-                <a:latin typeface="Courier New" panose="02070309020205020404" pitchFamily="49" charset="0"/>
-                <a:cs typeface="Courier New" panose="02070309020205020404" pitchFamily="49" charset="0"/>
-              </a:rPr>
-              <a:t>0</a:t>
-            </a:r>
-            <a:r>
-              <a:rPr lang="en-GB" sz="1600" dirty="0" smtClean="0">
-                <a:latin typeface="Courier New" panose="02070309020205020404" pitchFamily="49" charset="0"/>
-                <a:cs typeface="Courier New" panose="02070309020205020404" pitchFamily="49" charset="0"/>
-              </a:rPr>
-              <a:t>,2] * [1; 1]       % result: [1; 2]</a:t>
+              <a:t>&gt;&gt; [1,0; 0,2] * [1; 1]       % result: [1; 2]</a:t>
             </a:r>
           </a:p>
           <a:p>
@@ -27365,10 +27233,6 @@
               </a:rPr>
               <a:t>method(object, x, y, z)</a:t>
             </a:r>
-            <a:endParaRPr lang="en-GB" sz="1600" dirty="0" smtClean="0">
-              <a:latin typeface="Courier New" panose="02070309020205020404" pitchFamily="49" charset="0"/>
-              <a:cs typeface="Courier New" panose="02070309020205020404" pitchFamily="49" charset="0"/>
-            </a:endParaRPr>
           </a:p>
           <a:p>
             <a:endParaRPr lang="en-GB" sz="1600" dirty="0" smtClean="0">
@@ -28432,14 +28296,6 @@
               </a:rPr>
               <a:t>Objects and methods</a:t>
             </a:r>
-            <a:endParaRPr lang="en-GB" sz="1600" dirty="0" smtClean="0">
-              <a:solidFill>
-                <a:schemeClr val="bg2">
-                  <a:lumMod val="90000"/>
-                </a:schemeClr>
-              </a:solidFill>
-              <a:latin typeface="+mn-lt"/>
-            </a:endParaRPr>
           </a:p>
           <a:p>
             <a:pPr marL="457200" indent="-457200">

</xml_diff>